<commit_message>
kunn pp intet andet
</commit_message>
<xml_diff>
--- a/PowerPoint Presentation/Presentation of our solution.pptx
+++ b/PowerPoint Presentation/Presentation of our solution.pptx
@@ -10,9 +10,11 @@
     <p:sldId id="258" r:id="rId4"/>
     <p:sldId id="259" r:id="rId5"/>
     <p:sldId id="260" r:id="rId6"/>
-    <p:sldId id="261" r:id="rId7"/>
-    <p:sldId id="262" r:id="rId8"/>
-    <p:sldId id="263" r:id="rId9"/>
+    <p:sldId id="264" r:id="rId7"/>
+    <p:sldId id="266" r:id="rId8"/>
+    <p:sldId id="261" r:id="rId9"/>
+    <p:sldId id="262" r:id="rId10"/>
+    <p:sldId id="263" r:id="rId11"/>
   </p:sldIdLst>
   <p:sldSz cx="12192000" cy="6858000"/>
   <p:notesSz cx="6858000" cy="9144000"/>
@@ -266,7 +268,7 @@
           <a:p>
             <a:fld id="{C2631612-1310-4777-B52B-AB988692188E}" type="datetimeFigureOut">
               <a:rPr lang="en-US" smtClean="0"/>
-              <a:t>5/12/2021</a:t>
+              <a:t>5/13/2021</a:t>
             </a:fld>
             <a:endParaRPr lang="en-US"/>
           </a:p>
@@ -464,7 +466,7 @@
           <a:p>
             <a:fld id="{C2631612-1310-4777-B52B-AB988692188E}" type="datetimeFigureOut">
               <a:rPr lang="en-US" smtClean="0"/>
-              <a:t>5/12/2021</a:t>
+              <a:t>5/13/2021</a:t>
             </a:fld>
             <a:endParaRPr lang="en-US"/>
           </a:p>
@@ -672,7 +674,7 @@
           <a:p>
             <a:fld id="{C2631612-1310-4777-B52B-AB988692188E}" type="datetimeFigureOut">
               <a:rPr lang="en-US" smtClean="0"/>
-              <a:t>5/12/2021</a:t>
+              <a:t>5/13/2021</a:t>
             </a:fld>
             <a:endParaRPr lang="en-US"/>
           </a:p>
@@ -870,7 +872,7 @@
           <a:p>
             <a:fld id="{C2631612-1310-4777-B52B-AB988692188E}" type="datetimeFigureOut">
               <a:rPr lang="en-US" smtClean="0"/>
-              <a:t>5/12/2021</a:t>
+              <a:t>5/13/2021</a:t>
             </a:fld>
             <a:endParaRPr lang="en-US"/>
           </a:p>
@@ -1145,7 +1147,7 @@
           <a:p>
             <a:fld id="{C2631612-1310-4777-B52B-AB988692188E}" type="datetimeFigureOut">
               <a:rPr lang="en-US" smtClean="0"/>
-              <a:t>5/12/2021</a:t>
+              <a:t>5/13/2021</a:t>
             </a:fld>
             <a:endParaRPr lang="en-US"/>
           </a:p>
@@ -1410,7 +1412,7 @@
           <a:p>
             <a:fld id="{C2631612-1310-4777-B52B-AB988692188E}" type="datetimeFigureOut">
               <a:rPr lang="en-US" smtClean="0"/>
-              <a:t>5/12/2021</a:t>
+              <a:t>5/13/2021</a:t>
             </a:fld>
             <a:endParaRPr lang="en-US"/>
           </a:p>
@@ -1822,7 +1824,7 @@
           <a:p>
             <a:fld id="{C2631612-1310-4777-B52B-AB988692188E}" type="datetimeFigureOut">
               <a:rPr lang="en-US" smtClean="0"/>
-              <a:t>5/12/2021</a:t>
+              <a:t>5/13/2021</a:t>
             </a:fld>
             <a:endParaRPr lang="en-US"/>
           </a:p>
@@ -1963,7 +1965,7 @@
           <a:p>
             <a:fld id="{C2631612-1310-4777-B52B-AB988692188E}" type="datetimeFigureOut">
               <a:rPr lang="en-US" smtClean="0"/>
-              <a:t>5/12/2021</a:t>
+              <a:t>5/13/2021</a:t>
             </a:fld>
             <a:endParaRPr lang="en-US"/>
           </a:p>
@@ -2076,7 +2078,7 @@
           <a:p>
             <a:fld id="{C2631612-1310-4777-B52B-AB988692188E}" type="datetimeFigureOut">
               <a:rPr lang="en-US" smtClean="0"/>
-              <a:t>5/12/2021</a:t>
+              <a:t>5/13/2021</a:t>
             </a:fld>
             <a:endParaRPr lang="en-US"/>
           </a:p>
@@ -2387,7 +2389,7 @@
           <a:p>
             <a:fld id="{C2631612-1310-4777-B52B-AB988692188E}" type="datetimeFigureOut">
               <a:rPr lang="en-US" smtClean="0"/>
-              <a:t>5/12/2021</a:t>
+              <a:t>5/13/2021</a:t>
             </a:fld>
             <a:endParaRPr lang="en-US"/>
           </a:p>
@@ -2675,7 +2677,7 @@
           <a:p>
             <a:fld id="{C2631612-1310-4777-B52B-AB988692188E}" type="datetimeFigureOut">
               <a:rPr lang="en-US" smtClean="0"/>
-              <a:t>5/12/2021</a:t>
+              <a:t>5/13/2021</a:t>
             </a:fld>
             <a:endParaRPr lang="en-US"/>
           </a:p>
@@ -2916,7 +2918,7 @@
           <a:p>
             <a:fld id="{C2631612-1310-4777-B52B-AB988692188E}" type="datetimeFigureOut">
               <a:rPr lang="en-US" smtClean="0"/>
-              <a:t>5/12/2021</a:t>
+              <a:t>5/13/2021</a:t>
             </a:fld>
             <a:endParaRPr lang="en-US"/>
           </a:p>
@@ -3420,6 +3422,94 @@
 </p:sld>
 </file>
 
+<file path=ppt/slides/slide10.xml><?xml version="1.0" encoding="utf-8"?>
+<p:sld xmlns:a="http://schemas.openxmlformats.org/drawingml/2006/main" xmlns:r="http://schemas.openxmlformats.org/officeDocument/2006/relationships" xmlns:p="http://schemas.openxmlformats.org/presentationml/2006/main">
+  <p:cSld>
+    <p:spTree>
+      <p:nvGrpSpPr>
+        <p:cNvPr id="1" name=""/>
+        <p:cNvGrpSpPr/>
+        <p:nvPr/>
+      </p:nvGrpSpPr>
+      <p:grpSpPr>
+        <a:xfrm>
+          <a:off x="0" y="0"/>
+          <a:ext cx="0" cy="0"/>
+          <a:chOff x="0" y="0"/>
+          <a:chExt cx="0" cy="0"/>
+        </a:xfrm>
+      </p:grpSpPr>
+      <p:sp>
+        <p:nvSpPr>
+          <p:cNvPr id="2" name="Title 1">
+            <a:extLst>
+              <a:ext uri="{FF2B5EF4-FFF2-40B4-BE49-F238E27FC236}">
+                <a16:creationId xmlns:a16="http://schemas.microsoft.com/office/drawing/2014/main" id="{ED58314E-6DB4-436A-98B6-789DE1222134}"/>
+              </a:ext>
+            </a:extLst>
+          </p:cNvPr>
+          <p:cNvSpPr>
+            <a:spLocks noGrp="1"/>
+          </p:cNvSpPr>
+          <p:nvPr>
+            <p:ph type="title"/>
+          </p:nvPr>
+        </p:nvSpPr>
+        <p:spPr/>
+        <p:txBody>
+          <a:bodyPr/>
+          <a:lstStyle/>
+          <a:p>
+            <a:r>
+              <a:rPr lang="en-US" dirty="0">
+                <a:latin typeface="Lucida Bright" panose="02040602050505020304" pitchFamily="18" charset="0"/>
+              </a:rPr>
+              <a:t>DEMO</a:t>
+            </a:r>
+            <a:endParaRPr lang="da-DK" dirty="0">
+              <a:latin typeface="Lucida Bright" panose="02040602050505020304" pitchFamily="18" charset="0"/>
+            </a:endParaRPr>
+          </a:p>
+        </p:txBody>
+      </p:sp>
+      <p:sp>
+        <p:nvSpPr>
+          <p:cNvPr id="3" name="Content Placeholder 2">
+            <a:extLst>
+              <a:ext uri="{FF2B5EF4-FFF2-40B4-BE49-F238E27FC236}">
+                <a16:creationId xmlns:a16="http://schemas.microsoft.com/office/drawing/2014/main" id="{8AE6A92E-AC7C-48D2-9535-A71B16D416B7}"/>
+              </a:ext>
+            </a:extLst>
+          </p:cNvPr>
+          <p:cNvSpPr>
+            <a:spLocks noGrp="1"/>
+          </p:cNvSpPr>
+          <p:nvPr>
+            <p:ph idx="1"/>
+          </p:nvPr>
+        </p:nvSpPr>
+        <p:spPr/>
+        <p:txBody>
+          <a:bodyPr/>
+          <a:lstStyle/>
+          <a:p>
+            <a:endParaRPr lang="da-DK" dirty="0"/>
+          </a:p>
+        </p:txBody>
+      </p:sp>
+    </p:spTree>
+    <p:extLst>
+      <p:ext uri="{BB962C8B-B14F-4D97-AF65-F5344CB8AC3E}">
+        <p14:creationId xmlns:p14="http://schemas.microsoft.com/office/powerpoint/2010/main" val="1000083581"/>
+      </p:ext>
+    </p:extLst>
+  </p:cSld>
+  <p:clrMapOvr>
+    <a:masterClrMapping/>
+  </p:clrMapOvr>
+</p:sld>
+</file>
+
 <file path=ppt/slides/slide2.xml><?xml version="1.0" encoding="utf-8"?>
 <p:sld xmlns:a="http://schemas.openxmlformats.org/drawingml/2006/main" xmlns:r="http://schemas.openxmlformats.org/officeDocument/2006/relationships" xmlns:p="http://schemas.openxmlformats.org/presentationml/2006/main">
   <p:cSld>
@@ -4068,10 +4158,10 @@
       </p:sp>
       <p:pic>
         <p:nvPicPr>
-          <p:cNvPr id="5" name="Picture 4">
-            <a:extLst>
-              <a:ext uri="{FF2B5EF4-FFF2-40B4-BE49-F238E27FC236}">
-                <a16:creationId xmlns:a16="http://schemas.microsoft.com/office/drawing/2014/main" id="{97A605EA-54BD-41B3-B890-AA373A9CDE0B}"/>
+          <p:cNvPr id="6" name="Picture 5">
+            <a:extLst>
+              <a:ext uri="{FF2B5EF4-FFF2-40B4-BE49-F238E27FC236}">
+                <a16:creationId xmlns:a16="http://schemas.microsoft.com/office/drawing/2014/main" id="{AE021EAB-4763-4F0B-8A74-B1C869B99E1D}"/>
               </a:ext>
             </a:extLst>
           </p:cNvPr>
@@ -4081,21 +4171,15 @@
           <p:nvPr/>
         </p:nvPicPr>
         <p:blipFill>
-          <a:blip r:embed="rId2">
-            <a:extLst>
-              <a:ext uri="{28A0092B-C50C-407E-A947-70E740481C1C}">
-                <a14:useLocalDpi xmlns:a14="http://schemas.microsoft.com/office/drawing/2010/main" val="0"/>
-              </a:ext>
-            </a:extLst>
-          </a:blip>
+          <a:blip r:embed="rId2"/>
           <a:stretch>
             <a:fillRect/>
           </a:stretch>
         </p:blipFill>
         <p:spPr>
           <a:xfrm>
-            <a:off x="5039578" y="1042734"/>
-            <a:ext cx="2936942" cy="4772531"/>
+            <a:off x="8211987" y="1253331"/>
+            <a:ext cx="3141813" cy="4351338"/>
           </a:xfrm>
           <a:prstGeom prst="rect">
             <a:avLst/>
@@ -4104,10 +4188,10 @@
       </p:pic>
       <p:pic>
         <p:nvPicPr>
-          <p:cNvPr id="6" name="Picture 5">
-            <a:extLst>
-              <a:ext uri="{FF2B5EF4-FFF2-40B4-BE49-F238E27FC236}">
-                <a16:creationId xmlns:a16="http://schemas.microsoft.com/office/drawing/2014/main" id="{AE021EAB-4763-4F0B-8A74-B1C869B99E1D}"/>
+          <p:cNvPr id="9" name="Picture 8" descr="Diagram&#10;&#10;Description automatically generated">
+            <a:extLst>
+              <a:ext uri="{FF2B5EF4-FFF2-40B4-BE49-F238E27FC236}">
+                <a16:creationId xmlns:a16="http://schemas.microsoft.com/office/drawing/2014/main" id="{AAF455F7-472B-4BB4-9894-A98E0B4BCE39}"/>
               </a:ext>
             </a:extLst>
           </p:cNvPr>
@@ -4117,15 +4201,21 @@
           <p:nvPr/>
         </p:nvPicPr>
         <p:blipFill>
-          <a:blip r:embed="rId3"/>
+          <a:blip r:embed="rId3">
+            <a:extLst>
+              <a:ext uri="{28A0092B-C50C-407E-A947-70E740481C1C}">
+                <a14:useLocalDpi xmlns:a14="http://schemas.microsoft.com/office/drawing/2010/main" val="0"/>
+              </a:ext>
+            </a:extLst>
+          </a:blip>
           <a:stretch>
             <a:fillRect/>
           </a:stretch>
         </p:blipFill>
         <p:spPr>
           <a:xfrm>
-            <a:off x="8211987" y="1253331"/>
-            <a:ext cx="3141813" cy="4351338"/>
+            <a:off x="4525093" y="455497"/>
+            <a:ext cx="3141813" cy="5947005"/>
           </a:xfrm>
           <a:prstGeom prst="rect">
             <a:avLst/>
@@ -4167,6 +4257,398 @@
           <p:cNvPr id="2" name="Title 1">
             <a:extLst>
               <a:ext uri="{FF2B5EF4-FFF2-40B4-BE49-F238E27FC236}">
+                <a16:creationId xmlns:a16="http://schemas.microsoft.com/office/drawing/2014/main" id="{897A5D97-D149-4013-9090-D0F3CD1E9D01}"/>
+              </a:ext>
+            </a:extLst>
+          </p:cNvPr>
+          <p:cNvSpPr>
+            <a:spLocks noGrp="1"/>
+          </p:cNvSpPr>
+          <p:nvPr>
+            <p:ph type="title"/>
+          </p:nvPr>
+        </p:nvSpPr>
+        <p:spPr/>
+        <p:txBody>
+          <a:bodyPr/>
+          <a:lstStyle/>
+          <a:p>
+            <a:r>
+              <a:rPr lang="en-US" dirty="0">
+                <a:latin typeface="Lucida Bright" panose="02040602050505020304" pitchFamily="18" charset="0"/>
+              </a:rPr>
+              <a:t>FSM	</a:t>
+            </a:r>
+            <a:endParaRPr lang="da-DK" dirty="0">
+              <a:latin typeface="Lucida Bright" panose="02040602050505020304" pitchFamily="18" charset="0"/>
+            </a:endParaRPr>
+          </a:p>
+        </p:txBody>
+      </p:sp>
+      <p:sp>
+        <p:nvSpPr>
+          <p:cNvPr id="3" name="Content Placeholder 2">
+            <a:extLst>
+              <a:ext uri="{FF2B5EF4-FFF2-40B4-BE49-F238E27FC236}">
+                <a16:creationId xmlns:a16="http://schemas.microsoft.com/office/drawing/2014/main" id="{457B1A87-372B-49F9-8248-D7CC64874E2B}"/>
+              </a:ext>
+            </a:extLst>
+          </p:cNvPr>
+          <p:cNvSpPr>
+            <a:spLocks noGrp="1"/>
+          </p:cNvSpPr>
+          <p:nvPr>
+            <p:ph idx="1"/>
+          </p:nvPr>
+        </p:nvSpPr>
+        <p:spPr>
+          <a:xfrm>
+            <a:off x="838200" y="1825625"/>
+            <a:ext cx="3482130" cy="4351338"/>
+          </a:xfrm>
+        </p:spPr>
+        <p:txBody>
+          <a:bodyPr/>
+          <a:lstStyle/>
+          <a:p>
+            <a:r>
+              <a:rPr lang="en-US" dirty="0">
+                <a:latin typeface="Lucida Bright" panose="02040602050505020304" pitchFamily="18" charset="0"/>
+              </a:rPr>
+              <a:t>Payment</a:t>
+            </a:r>
+          </a:p>
+          <a:p>
+            <a:pPr lvl="1"/>
+            <a:r>
+              <a:rPr lang="en-US" dirty="0">
+                <a:latin typeface="Lucida Bright" panose="02040602050505020304" pitchFamily="18" charset="0"/>
+              </a:rPr>
+              <a:t>State logic</a:t>
+            </a:r>
+          </a:p>
+          <a:p>
+            <a:pPr lvl="1"/>
+            <a:r>
+              <a:rPr lang="en-US" dirty="0">
+                <a:latin typeface="Lucida Bright" panose="02040602050505020304" pitchFamily="18" charset="0"/>
+              </a:rPr>
+              <a:t>Card</a:t>
+            </a:r>
+            <a:endParaRPr lang="da-DK" dirty="0">
+              <a:latin typeface="Lucida Bright" panose="02040602050505020304" pitchFamily="18" charset="0"/>
+            </a:endParaRPr>
+          </a:p>
+        </p:txBody>
+      </p:sp>
+      <p:pic>
+        <p:nvPicPr>
+          <p:cNvPr id="5" name="Picture 4">
+            <a:extLst>
+              <a:ext uri="{FF2B5EF4-FFF2-40B4-BE49-F238E27FC236}">
+                <a16:creationId xmlns:a16="http://schemas.microsoft.com/office/drawing/2014/main" id="{9621E412-2BA5-4664-8A2A-5322A366155A}"/>
+              </a:ext>
+            </a:extLst>
+          </p:cNvPr>
+          <p:cNvPicPr>
+            <a:picLocks noChangeAspect="1"/>
+          </p:cNvPicPr>
+          <p:nvPr/>
+        </p:nvPicPr>
+        <p:blipFill>
+          <a:blip r:embed="rId2"/>
+          <a:stretch>
+            <a:fillRect/>
+          </a:stretch>
+        </p:blipFill>
+        <p:spPr>
+          <a:xfrm>
+            <a:off x="3571117" y="681037"/>
+            <a:ext cx="3722710" cy="2726826"/>
+          </a:xfrm>
+          <a:prstGeom prst="rect">
+            <a:avLst/>
+          </a:prstGeom>
+        </p:spPr>
+      </p:pic>
+      <p:pic>
+        <p:nvPicPr>
+          <p:cNvPr id="7" name="Picture 6">
+            <a:extLst>
+              <a:ext uri="{FF2B5EF4-FFF2-40B4-BE49-F238E27FC236}">
+                <a16:creationId xmlns:a16="http://schemas.microsoft.com/office/drawing/2014/main" id="{589E2F4D-FAC4-4A62-90A3-21630C1127E1}"/>
+              </a:ext>
+            </a:extLst>
+          </p:cNvPr>
+          <p:cNvPicPr>
+            <a:picLocks noChangeAspect="1"/>
+          </p:cNvPicPr>
+          <p:nvPr/>
+        </p:nvPicPr>
+        <p:blipFill>
+          <a:blip r:embed="rId3"/>
+          <a:stretch>
+            <a:fillRect/>
+          </a:stretch>
+        </p:blipFill>
+        <p:spPr>
+          <a:xfrm>
+            <a:off x="3571117" y="3590002"/>
+            <a:ext cx="4133520" cy="2721898"/>
+          </a:xfrm>
+          <a:prstGeom prst="rect">
+            <a:avLst/>
+          </a:prstGeom>
+        </p:spPr>
+      </p:pic>
+      <p:pic>
+        <p:nvPicPr>
+          <p:cNvPr id="11" name="Picture 10">
+            <a:extLst>
+              <a:ext uri="{FF2B5EF4-FFF2-40B4-BE49-F238E27FC236}">
+                <a16:creationId xmlns:a16="http://schemas.microsoft.com/office/drawing/2014/main" id="{11FB88BB-48F6-4512-8E49-B968402F6137}"/>
+              </a:ext>
+            </a:extLst>
+          </p:cNvPr>
+          <p:cNvPicPr>
+            <a:picLocks noChangeAspect="1"/>
+          </p:cNvPicPr>
+          <p:nvPr/>
+        </p:nvPicPr>
+        <p:blipFill rotWithShape="1">
+          <a:blip r:embed="rId4"/>
+          <a:srcRect l="2437"/>
+          <a:stretch/>
+        </p:blipFill>
+        <p:spPr>
+          <a:xfrm>
+            <a:off x="7871672" y="0"/>
+            <a:ext cx="4242807" cy="6858000"/>
+          </a:xfrm>
+          <a:prstGeom prst="rect">
+            <a:avLst/>
+          </a:prstGeom>
+        </p:spPr>
+      </p:pic>
+    </p:spTree>
+    <p:extLst>
+      <p:ext uri="{BB962C8B-B14F-4D97-AF65-F5344CB8AC3E}">
+        <p14:creationId xmlns:p14="http://schemas.microsoft.com/office/powerpoint/2010/main" val="218456736"/>
+      </p:ext>
+    </p:extLst>
+  </p:cSld>
+  <p:clrMapOvr>
+    <a:masterClrMapping/>
+  </p:clrMapOvr>
+</p:sld>
+</file>
+
+<file path=ppt/slides/slide7.xml><?xml version="1.0" encoding="utf-8"?>
+<p:sld xmlns:a="http://schemas.openxmlformats.org/drawingml/2006/main" xmlns:r="http://schemas.openxmlformats.org/officeDocument/2006/relationships" xmlns:p="http://schemas.openxmlformats.org/presentationml/2006/main">
+  <p:cSld>
+    <p:spTree>
+      <p:nvGrpSpPr>
+        <p:cNvPr id="1" name=""/>
+        <p:cNvGrpSpPr/>
+        <p:nvPr/>
+      </p:nvGrpSpPr>
+      <p:grpSpPr>
+        <a:xfrm>
+          <a:off x="0" y="0"/>
+          <a:ext cx="0" cy="0"/>
+          <a:chOff x="0" y="0"/>
+          <a:chExt cx="0" cy="0"/>
+        </a:xfrm>
+      </p:grpSpPr>
+      <p:sp>
+        <p:nvSpPr>
+          <p:cNvPr id="2" name="Title 1">
+            <a:extLst>
+              <a:ext uri="{FF2B5EF4-FFF2-40B4-BE49-F238E27FC236}">
+                <a16:creationId xmlns:a16="http://schemas.microsoft.com/office/drawing/2014/main" id="{897A5D97-D149-4013-9090-D0F3CD1E9D01}"/>
+              </a:ext>
+            </a:extLst>
+          </p:cNvPr>
+          <p:cNvSpPr>
+            <a:spLocks noGrp="1"/>
+          </p:cNvSpPr>
+          <p:nvPr>
+            <p:ph type="title"/>
+          </p:nvPr>
+        </p:nvSpPr>
+        <p:spPr/>
+        <p:txBody>
+          <a:bodyPr/>
+          <a:lstStyle/>
+          <a:p>
+            <a:r>
+              <a:rPr lang="en-US" dirty="0">
+                <a:latin typeface="Lucida Bright" panose="02040602050505020304" pitchFamily="18" charset="0"/>
+              </a:rPr>
+              <a:t>FSM	</a:t>
+            </a:r>
+            <a:endParaRPr lang="da-DK" dirty="0">
+              <a:latin typeface="Lucida Bright" panose="02040602050505020304" pitchFamily="18" charset="0"/>
+            </a:endParaRPr>
+          </a:p>
+        </p:txBody>
+      </p:sp>
+      <p:sp>
+        <p:nvSpPr>
+          <p:cNvPr id="3" name="Content Placeholder 2">
+            <a:extLst>
+              <a:ext uri="{FF2B5EF4-FFF2-40B4-BE49-F238E27FC236}">
+                <a16:creationId xmlns:a16="http://schemas.microsoft.com/office/drawing/2014/main" id="{457B1A87-372B-49F9-8248-D7CC64874E2B}"/>
+              </a:ext>
+            </a:extLst>
+          </p:cNvPr>
+          <p:cNvSpPr>
+            <a:spLocks noGrp="1"/>
+          </p:cNvSpPr>
+          <p:nvPr>
+            <p:ph idx="1"/>
+          </p:nvPr>
+        </p:nvSpPr>
+        <p:spPr>
+          <a:xfrm>
+            <a:off x="838200" y="1825625"/>
+            <a:ext cx="3482130" cy="4351338"/>
+          </a:xfrm>
+        </p:spPr>
+        <p:txBody>
+          <a:bodyPr/>
+          <a:lstStyle/>
+          <a:p>
+            <a:r>
+              <a:rPr lang="en-US" dirty="0">
+                <a:latin typeface="Lucida Bright" panose="02040602050505020304" pitchFamily="18" charset="0"/>
+              </a:rPr>
+              <a:t>Payment</a:t>
+            </a:r>
+          </a:p>
+          <a:p>
+            <a:pPr lvl="1"/>
+            <a:r>
+              <a:rPr lang="en-US" dirty="0">
+                <a:latin typeface="Lucida Bright" panose="02040602050505020304" pitchFamily="18" charset="0"/>
+              </a:rPr>
+              <a:t>State logic</a:t>
+            </a:r>
+          </a:p>
+          <a:p>
+            <a:pPr lvl="1"/>
+            <a:r>
+              <a:rPr lang="en-US" dirty="0">
+                <a:latin typeface="Lucida Bright" panose="02040602050505020304" pitchFamily="18" charset="0"/>
+              </a:rPr>
+              <a:t>Cash</a:t>
+            </a:r>
+          </a:p>
+          <a:p>
+            <a:pPr marL="457200" lvl="1" indent="0">
+              <a:buNone/>
+            </a:pPr>
+            <a:endParaRPr lang="da-DK" dirty="0">
+              <a:latin typeface="Lucida Bright" panose="02040602050505020304" pitchFamily="18" charset="0"/>
+            </a:endParaRPr>
+          </a:p>
+        </p:txBody>
+      </p:sp>
+      <p:pic>
+        <p:nvPicPr>
+          <p:cNvPr id="6" name="Picture 5">
+            <a:extLst>
+              <a:ext uri="{FF2B5EF4-FFF2-40B4-BE49-F238E27FC236}">
+                <a16:creationId xmlns:a16="http://schemas.microsoft.com/office/drawing/2014/main" id="{41FEDFC6-887F-41FB-9FF6-47445AB73ED0}"/>
+              </a:ext>
+            </a:extLst>
+          </p:cNvPr>
+          <p:cNvPicPr>
+            <a:picLocks noChangeAspect="1"/>
+          </p:cNvPicPr>
+          <p:nvPr/>
+        </p:nvPicPr>
+        <p:blipFill>
+          <a:blip r:embed="rId2"/>
+          <a:stretch>
+            <a:fillRect/>
+          </a:stretch>
+        </p:blipFill>
+        <p:spPr>
+          <a:xfrm>
+            <a:off x="4441601" y="680271"/>
+            <a:ext cx="3848637" cy="5496692"/>
+          </a:xfrm>
+          <a:prstGeom prst="rect">
+            <a:avLst/>
+          </a:prstGeom>
+        </p:spPr>
+      </p:pic>
+      <p:pic>
+        <p:nvPicPr>
+          <p:cNvPr id="9" name="Picture 8">
+            <a:extLst>
+              <a:ext uri="{FF2B5EF4-FFF2-40B4-BE49-F238E27FC236}">
+                <a16:creationId xmlns:a16="http://schemas.microsoft.com/office/drawing/2014/main" id="{2CF93D76-052E-491C-A2F3-9C9FC83E6BE4}"/>
+              </a:ext>
+            </a:extLst>
+          </p:cNvPr>
+          <p:cNvPicPr>
+            <a:picLocks noChangeAspect="1"/>
+          </p:cNvPicPr>
+          <p:nvPr/>
+        </p:nvPicPr>
+        <p:blipFill>
+          <a:blip r:embed="rId3"/>
+          <a:stretch>
+            <a:fillRect/>
+          </a:stretch>
+        </p:blipFill>
+        <p:spPr>
+          <a:xfrm>
+            <a:off x="8290238" y="680271"/>
+            <a:ext cx="3743847" cy="2391109"/>
+          </a:xfrm>
+          <a:prstGeom prst="rect">
+            <a:avLst/>
+          </a:prstGeom>
+        </p:spPr>
+      </p:pic>
+    </p:spTree>
+    <p:extLst>
+      <p:ext uri="{BB962C8B-B14F-4D97-AF65-F5344CB8AC3E}">
+        <p14:creationId xmlns:p14="http://schemas.microsoft.com/office/powerpoint/2010/main" val="3868704441"/>
+      </p:ext>
+    </p:extLst>
+  </p:cSld>
+  <p:clrMapOvr>
+    <a:masterClrMapping/>
+  </p:clrMapOvr>
+</p:sld>
+</file>
+
+<file path=ppt/slides/slide8.xml><?xml version="1.0" encoding="utf-8"?>
+<p:sld xmlns:a="http://schemas.openxmlformats.org/drawingml/2006/main" xmlns:r="http://schemas.openxmlformats.org/officeDocument/2006/relationships" xmlns:p="http://schemas.openxmlformats.org/presentationml/2006/main">
+  <p:cSld>
+    <p:spTree>
+      <p:nvGrpSpPr>
+        <p:cNvPr id="1" name=""/>
+        <p:cNvGrpSpPr/>
+        <p:nvPr/>
+      </p:nvGrpSpPr>
+      <p:grpSpPr>
+        <a:xfrm>
+          <a:off x="0" y="0"/>
+          <a:ext cx="0" cy="0"/>
+          <a:chOff x="0" y="0"/>
+          <a:chExt cx="0" cy="0"/>
+        </a:xfrm>
+      </p:grpSpPr>
+      <p:sp>
+        <p:nvSpPr>
+          <p:cNvPr id="2" name="Title 1">
+            <a:extLst>
+              <a:ext uri="{FF2B5EF4-FFF2-40B4-BE49-F238E27FC236}">
                 <a16:creationId xmlns:a16="http://schemas.microsoft.com/office/drawing/2014/main" id="{8B7F86C3-E733-433C-90B4-FB7E43E1024B}"/>
               </a:ext>
             </a:extLst>
@@ -4295,7 +4777,7 @@
 </p:sld>
 </file>
 
-<file path=ppt/slides/slide7.xml><?xml version="1.0" encoding="utf-8"?>
+<file path=ppt/slides/slide9.xml><?xml version="1.0" encoding="utf-8"?>
 <p:sld xmlns:a="http://schemas.openxmlformats.org/drawingml/2006/main" xmlns:r="http://schemas.openxmlformats.org/officeDocument/2006/relationships" xmlns:p="http://schemas.openxmlformats.org/presentationml/2006/main">
   <p:cSld>
     <p:spTree>
@@ -4439,94 +4921,6 @@
     <p:extLst>
       <p:ext uri="{BB962C8B-B14F-4D97-AF65-F5344CB8AC3E}">
         <p14:creationId xmlns:p14="http://schemas.microsoft.com/office/powerpoint/2010/main" val="2557539404"/>
-      </p:ext>
-    </p:extLst>
-  </p:cSld>
-  <p:clrMapOvr>
-    <a:masterClrMapping/>
-  </p:clrMapOvr>
-</p:sld>
-</file>
-
-<file path=ppt/slides/slide8.xml><?xml version="1.0" encoding="utf-8"?>
-<p:sld xmlns:a="http://schemas.openxmlformats.org/drawingml/2006/main" xmlns:r="http://schemas.openxmlformats.org/officeDocument/2006/relationships" xmlns:p="http://schemas.openxmlformats.org/presentationml/2006/main">
-  <p:cSld>
-    <p:spTree>
-      <p:nvGrpSpPr>
-        <p:cNvPr id="1" name=""/>
-        <p:cNvGrpSpPr/>
-        <p:nvPr/>
-      </p:nvGrpSpPr>
-      <p:grpSpPr>
-        <a:xfrm>
-          <a:off x="0" y="0"/>
-          <a:ext cx="0" cy="0"/>
-          <a:chOff x="0" y="0"/>
-          <a:chExt cx="0" cy="0"/>
-        </a:xfrm>
-      </p:grpSpPr>
-      <p:sp>
-        <p:nvSpPr>
-          <p:cNvPr id="2" name="Title 1">
-            <a:extLst>
-              <a:ext uri="{FF2B5EF4-FFF2-40B4-BE49-F238E27FC236}">
-                <a16:creationId xmlns:a16="http://schemas.microsoft.com/office/drawing/2014/main" id="{ED58314E-6DB4-436A-98B6-789DE1222134}"/>
-              </a:ext>
-            </a:extLst>
-          </p:cNvPr>
-          <p:cNvSpPr>
-            <a:spLocks noGrp="1"/>
-          </p:cNvSpPr>
-          <p:nvPr>
-            <p:ph type="title"/>
-          </p:nvPr>
-        </p:nvSpPr>
-        <p:spPr/>
-        <p:txBody>
-          <a:bodyPr/>
-          <a:lstStyle/>
-          <a:p>
-            <a:r>
-              <a:rPr lang="en-US" dirty="0">
-                <a:latin typeface="Lucida Bright" panose="02040602050505020304" pitchFamily="18" charset="0"/>
-              </a:rPr>
-              <a:t>DEMO</a:t>
-            </a:r>
-            <a:endParaRPr lang="da-DK" dirty="0">
-              <a:latin typeface="Lucida Bright" panose="02040602050505020304" pitchFamily="18" charset="0"/>
-            </a:endParaRPr>
-          </a:p>
-        </p:txBody>
-      </p:sp>
-      <p:sp>
-        <p:nvSpPr>
-          <p:cNvPr id="3" name="Content Placeholder 2">
-            <a:extLst>
-              <a:ext uri="{FF2B5EF4-FFF2-40B4-BE49-F238E27FC236}">
-                <a16:creationId xmlns:a16="http://schemas.microsoft.com/office/drawing/2014/main" id="{8AE6A92E-AC7C-48D2-9535-A71B16D416B7}"/>
-              </a:ext>
-            </a:extLst>
-          </p:cNvPr>
-          <p:cNvSpPr>
-            <a:spLocks noGrp="1"/>
-          </p:cNvSpPr>
-          <p:nvPr>
-            <p:ph idx="1"/>
-          </p:nvPr>
-        </p:nvSpPr>
-        <p:spPr/>
-        <p:txBody>
-          <a:bodyPr/>
-          <a:lstStyle/>
-          <a:p>
-            <a:endParaRPr lang="da-DK" dirty="0"/>
-          </a:p>
-        </p:txBody>
-      </p:sp>
-    </p:spTree>
-    <p:extLst>
-      <p:ext uri="{BB962C8B-B14F-4D97-AF65-F5344CB8AC3E}">
-        <p14:creationId xmlns:p14="http://schemas.microsoft.com/office/powerpoint/2010/main" val="1000083581"/>
       </p:ext>
     </p:extLst>
   </p:cSld>

</xml_diff>